<commit_message>
add: Se actualiza diapositiva de 3 trimestre
</commit_message>
<xml_diff>
--- a/3.Diseño/Presentacion2tri.pptx
+++ b/3.Diseño/Presentacion2tri.pptx
@@ -5,7 +5,7 @@
     <p:sldMasterId id="2147483648" r:id="rId1"/>
   </p:sldMasterIdLst>
   <p:notesMasterIdLst>
-    <p:notesMasterId r:id="rId16"/>
+    <p:notesMasterId r:id="rId15"/>
   </p:notesMasterIdLst>
   <p:sldIdLst>
     <p:sldId id="256" r:id="rId2"/>
@@ -14,14 +14,13 @@
     <p:sldId id="368" r:id="rId5"/>
     <p:sldId id="369" r:id="rId6"/>
     <p:sldId id="370" r:id="rId7"/>
-    <p:sldId id="371" r:id="rId8"/>
-    <p:sldId id="372" r:id="rId9"/>
+    <p:sldId id="372" r:id="rId8"/>
+    <p:sldId id="377" r:id="rId9"/>
     <p:sldId id="373" r:id="rId10"/>
     <p:sldId id="374" r:id="rId11"/>
     <p:sldId id="375" r:id="rId12"/>
     <p:sldId id="376" r:id="rId13"/>
     <p:sldId id="325" r:id="rId14"/>
-    <p:sldId id="308" r:id="rId15"/>
   </p:sldIdLst>
   <p:sldSz cx="24384000" cy="15748000"/>
   <p:notesSz cx="6858000" cy="9144000"/>
@@ -1509,58 +1508,6 @@
 </p:sldLayout>
 </file>
 
-<file path=ppt/slideLayouts/slideLayout8.xml><?xml version="1.0" encoding="utf-8"?>
-<p:sldLayout xmlns:a="http://schemas.openxmlformats.org/drawingml/2006/main" xmlns:r="http://schemas.openxmlformats.org/officeDocument/2006/relationships" xmlns:p="http://schemas.openxmlformats.org/presentationml/2006/main" type="tx">
-  <p:cSld name="En blanco">
-    <p:spTree>
-      <p:nvGrpSpPr>
-        <p:cNvPr id="1" name=""/>
-        <p:cNvGrpSpPr/>
-        <p:nvPr/>
-      </p:nvGrpSpPr>
-      <p:grpSpPr>
-        <a:xfrm>
-          <a:off x="0" y="0"/>
-          <a:ext cx="0" cy="0"/>
-          <a:chOff x="0" y="0"/>
-          <a:chExt cx="0" cy="0"/>
-        </a:xfrm>
-      </p:grpSpPr>
-      <p:sp>
-        <p:nvSpPr>
-          <p:cNvPr id="110" name="Número de diapositiva"/>
-          <p:cNvSpPr txBox="1">
-            <a:spLocks noGrp="1"/>
-          </p:cNvSpPr>
-          <p:nvPr>
-            <p:ph type="sldNum" sz="quarter" idx="2"/>
-          </p:nvPr>
-        </p:nvSpPr>
-        <p:spPr>
-          <a:prstGeom prst="rect">
-            <a:avLst/>
-          </a:prstGeom>
-        </p:spPr>
-        <p:txBody>
-          <a:bodyPr/>
-          <a:lstStyle/>
-          <a:p>
-            <a:fld id="{86CB4B4D-7CA3-9044-876B-883B54F8677D}" type="slidenum">
-              <a:t>‹Nº›</a:t>
-            </a:fld>
-            <a:endParaRPr/>
-          </a:p>
-        </p:txBody>
-      </p:sp>
-    </p:spTree>
-  </p:cSld>
-  <p:clrMapOvr>
-    <a:masterClrMapping/>
-  </p:clrMapOvr>
-  <p:transition spd="med"/>
-</p:sldLayout>
-</file>
-
 <file path=ppt/slideMasters/slideMaster1.xml><?xml version="1.0" encoding="utf-8"?>
 <p:sldMaster xmlns:a="http://schemas.openxmlformats.org/drawingml/2006/main" xmlns:r="http://schemas.openxmlformats.org/officeDocument/2006/relationships" xmlns:p="http://schemas.openxmlformats.org/presentationml/2006/main">
   <p:cSld>
@@ -1609,7 +1556,7 @@
           </a:ln>
           <a:extLst>
             <a:ext uri="{C572A759-6A51-4108-AA02-DFA0A04FC94B}">
-              <ma14:wrappingTextBoxFlag xmlns="" xmlns:ma14="http://schemas.microsoft.com/office/mac/drawingml/2011/main" val="1"/>
+              <ma14:wrappingTextBoxFlag xmlns:ma14="http://schemas.microsoft.com/office/mac/drawingml/2011/main" xmlns="" val="1"/>
             </a:ext>
           </a:extLst>
         </p:spPr>
@@ -1672,7 +1619,7 @@
           </a:ln>
           <a:extLst>
             <a:ext uri="{C572A759-6A51-4108-AA02-DFA0A04FC94B}">
-              <ma14:wrappingTextBoxFlag xmlns="" xmlns:ma14="http://schemas.microsoft.com/office/mac/drawingml/2011/main" val="1"/>
+              <ma14:wrappingTextBoxFlag xmlns:ma14="http://schemas.microsoft.com/office/mac/drawingml/2011/main" xmlns="" val="1"/>
             </a:ext>
           </a:extLst>
         </p:spPr>
@@ -1743,7 +1690,6 @@
     <p:sldLayoutId id="2147483657" r:id="rId5"/>
     <p:sldLayoutId id="2147483658" r:id="rId6"/>
     <p:sldLayoutId id="2147483659" r:id="rId7"/>
-    <p:sldLayoutId id="2147483660" r:id="rId8"/>
   </p:sldLayoutIdLst>
   <p:transition spd="med"/>
   <p:txStyles>
@@ -2589,7 +2535,7 @@
           <a:lstStyle/>
           <a:p>
             <a:r>
-              <a:rPr lang="es-ES" b="1" i="1" dirty="0" smtClean="0">
+              <a:rPr lang="es-ES" b="1" i="1" dirty="0">
                 <a:solidFill>
                   <a:schemeClr val="bg1">
                     <a:lumMod val="65000"/>
@@ -2599,14 +2545,6 @@
               </a:rPr>
               <a:t>QR LEAN</a:t>
             </a:r>
-            <a:endParaRPr lang="es-ES" b="1" i="1" dirty="0">
-              <a:solidFill>
-                <a:schemeClr val="bg1">
-                  <a:lumMod val="65000"/>
-                  <a:lumOff val="35000"/>
-                </a:schemeClr>
-              </a:solidFill>
-            </a:endParaRPr>
           </a:p>
         </p:txBody>
       </p:sp>
@@ -2634,7 +2572,7 @@
           <a:p>
             <a:pPr algn="l"/>
             <a:r>
-              <a:rPr lang="es-ES" dirty="0" smtClean="0">
+              <a:rPr lang="es-ES" dirty="0">
                 <a:solidFill>
                   <a:schemeClr val="bg1">
                     <a:lumMod val="65000"/>
@@ -2659,7 +2597,7 @@
           <a:p>
             <a:pPr algn="l"/>
             <a:r>
-              <a:rPr lang="es-ES" dirty="0" smtClean="0">
+              <a:rPr lang="es-ES" dirty="0">
                 <a:solidFill>
                   <a:schemeClr val="bg1">
                     <a:lumMod val="65000"/>
@@ -2673,7 +2611,7 @@
           <a:p>
             <a:pPr algn="l"/>
             <a:r>
-              <a:rPr lang="es-ES" dirty="0" smtClean="0">
+              <a:rPr lang="es-ES" dirty="0">
                 <a:solidFill>
                   <a:schemeClr val="bg1">
                     <a:lumMod val="65000"/>
@@ -2687,7 +2625,7 @@
           <a:p>
             <a:pPr algn="l"/>
             <a:r>
-              <a:rPr lang="es-ES" dirty="0" smtClean="0">
+              <a:rPr lang="es-ES" dirty="0">
                 <a:solidFill>
                   <a:schemeClr val="bg1">
                     <a:lumMod val="65000"/>
@@ -2701,7 +2639,7 @@
           <a:p>
             <a:pPr algn="l"/>
             <a:r>
-              <a:rPr lang="es-ES" dirty="0" err="1" smtClean="0">
+              <a:rPr lang="es-ES" dirty="0" err="1">
                 <a:solidFill>
                   <a:schemeClr val="bg1">
                     <a:lumMod val="65000"/>
@@ -2712,7 +2650,7 @@
               <a:t>Jhon</a:t>
             </a:r>
             <a:r>
-              <a:rPr lang="es-ES" dirty="0" smtClean="0">
+              <a:rPr lang="es-ES" dirty="0">
                 <a:solidFill>
                   <a:schemeClr val="bg1">
                     <a:lumMod val="65000"/>
@@ -2737,7 +2675,7 @@
           <a:p>
             <a:pPr algn="l"/>
             <a:r>
-              <a:rPr lang="es-ES" dirty="0" smtClean="0">
+              <a:rPr lang="es-ES" dirty="0">
                 <a:solidFill>
                   <a:schemeClr val="bg1">
                     <a:lumMod val="65000"/>
@@ -2747,14 +2685,6 @@
               </a:rPr>
               <a:t>Graciela Arias</a:t>
             </a:r>
-            <a:endParaRPr lang="es-ES" dirty="0">
-              <a:solidFill>
-                <a:schemeClr val="bg1">
-                  <a:lumMod val="65000"/>
-                  <a:lumOff val="35000"/>
-                </a:schemeClr>
-              </a:solidFill>
-            </a:endParaRPr>
           </a:p>
         </p:txBody>
       </p:sp>
@@ -2866,17 +2796,6 @@
           <a:lstStyle/>
           <a:p>
             <a:r>
-              <a:rPr lang="es-ES" sz="9600" b="1" i="1" dirty="0" smtClean="0">
-                <a:solidFill>
-                  <a:schemeClr val="bg1">
-                    <a:lumMod val="85000"/>
-                    <a:lumOff val="15000"/>
-                  </a:schemeClr>
-                </a:solidFill>
-              </a:rPr>
-              <a:t>Inventario, sistema </a:t>
-            </a:r>
-            <a:r>
               <a:rPr lang="es-ES" sz="9600" b="1" i="1" dirty="0">
                 <a:solidFill>
                   <a:schemeClr val="bg1">
@@ -2885,9 +2804,145 @@
                   </a:schemeClr>
                 </a:solidFill>
               </a:rPr>
-              <a:t>de información</a:t>
+              <a:t>Inventario, sistema de información</a:t>
             </a:r>
             <a:endParaRPr lang="es-ES" b="1" i="1" dirty="0"/>
+          </a:p>
+        </p:txBody>
+      </p:sp>
+      <p:sp>
+        <p:nvSpPr>
+          <p:cNvPr id="4" name="CuadroTexto 3">
+            <a:extLst>
+              <a:ext uri="{FF2B5EF4-FFF2-40B4-BE49-F238E27FC236}">
+                <a16:creationId xmlns:a16="http://schemas.microsoft.com/office/drawing/2014/main" id="{1610C939-3F4F-4070-975D-40BC4F3D25C7}"/>
+              </a:ext>
+            </a:extLst>
+          </p:cNvPr>
+          <p:cNvSpPr txBox="1"/>
+          <p:nvPr/>
+        </p:nvSpPr>
+        <p:spPr>
+          <a:xfrm>
+            <a:off x="10760519" y="7524866"/>
+            <a:ext cx="2862962" cy="698267"/>
+          </a:xfrm>
+          <a:prstGeom prst="rect">
+            <a:avLst/>
+          </a:prstGeom>
+          <a:noFill/>
+          <a:ln w="12700" cap="flat">
+            <a:noFill/>
+            <a:miter lim="400000"/>
+          </a:ln>
+          <a:effectLst/>
+          <a:sp3d/>
+        </p:spPr>
+        <p:style>
+          <a:lnRef idx="0">
+            <a:scrgbClr r="0" g="0" b="0"/>
+          </a:lnRef>
+          <a:fillRef idx="0">
+            <a:scrgbClr r="0" g="0" b="0"/>
+          </a:fillRef>
+          <a:effectRef idx="0">
+            <a:scrgbClr r="0" g="0" b="0"/>
+          </a:effectRef>
+          <a:fontRef idx="none"/>
+        </p:style>
+        <p:txBody>
+          <a:bodyPr rot="0" spcFirstLastPara="1" vertOverflow="overflow" horzOverflow="overflow" vert="horz" wrap="none" lIns="71437" tIns="71437" rIns="71437" bIns="71437" numCol="1" spcCol="38100" rtlCol="0" anchor="ctr">
+            <a:spAutoFit/>
+          </a:bodyPr>
+          <a:lstStyle/>
+          <a:p>
+            <a:pPr marL="0" marR="0" indent="0" defTabSz="943239" rtl="0" fontAlgn="auto" latinLnBrk="0" hangingPunct="0">
+              <a:lnSpc>
+                <a:spcPct val="100000"/>
+              </a:lnSpc>
+              <a:spcBef>
+                <a:spcPts val="0"/>
+              </a:spcBef>
+              <a:spcAft>
+                <a:spcPts val="0"/>
+              </a:spcAft>
+              <a:buClrTx/>
+              <a:buSzTx/>
+              <a:buFontTx/>
+              <a:buNone/>
+              <a:tabLst/>
+            </a:pPr>
+            <a:r>
+              <a:rPr kumimoji="0" lang="es-CO" sz="3600" b="0" i="0" u="none" strike="noStrike" cap="none" spc="0" normalizeH="0" baseline="0" dirty="0">
+                <a:ln>
+                  <a:noFill/>
+                </a:ln>
+                <a:solidFill>
+                  <a:schemeClr val="bg1">
+                    <a:lumMod val="75000"/>
+                    <a:lumOff val="25000"/>
+                  </a:schemeClr>
+                </a:solidFill>
+                <a:effectLst/>
+                <a:uFillTx/>
+                <a:latin typeface="Helvetica Neue"/>
+                <a:ea typeface="Helvetica Neue"/>
+                <a:cs typeface="Helvetica Neue"/>
+                <a:sym typeface="Helvetica Neue"/>
+                <a:hlinkClick r:id="rId4" action="ppaction://hlinkfile">
+                  <a:extLst>
+                    <a:ext uri="{A12FA001-AC4F-418D-AE19-62706E023703}">
+                      <ahyp:hlinkClr xmlns:ahyp="http://schemas.microsoft.com/office/drawing/2018/hyperlinkcolor" val="tx"/>
+                    </a:ext>
+                  </a:extLst>
+                </a:hlinkClick>
+              </a:rPr>
+              <a:t>Abrir </a:t>
+            </a:r>
+            <a:r>
+              <a:rPr kumimoji="0" lang="es-CO" sz="3600" b="0" i="1" u="none" strike="noStrike" cap="none" spc="0" normalizeH="0" baseline="0" dirty="0">
+                <a:ln>
+                  <a:noFill/>
+                </a:ln>
+                <a:solidFill>
+                  <a:schemeClr val="bg1">
+                    <a:lumMod val="75000"/>
+                    <a:lumOff val="25000"/>
+                  </a:schemeClr>
+                </a:solidFill>
+                <a:effectLst/>
+                <a:uFillTx/>
+                <a:latin typeface="Helvetica Neue"/>
+                <a:ea typeface="Helvetica Neue"/>
+                <a:cs typeface="Helvetica Neue"/>
+                <a:sym typeface="Helvetica Neue"/>
+                <a:hlinkClick r:id="rId4" action="ppaction://hlinkfile">
+                  <a:extLst>
+                    <a:ext uri="{A12FA001-AC4F-418D-AE19-62706E023703}">
+                      <ahyp:hlinkClr xmlns:ahyp="http://schemas.microsoft.com/office/drawing/2018/hyperlinkcolor" val="tx"/>
+                    </a:ext>
+                  </a:extLst>
+                </a:hlinkClick>
+              </a:rPr>
+              <a:t>archivo.</a:t>
+            </a:r>
+            <a:endParaRPr kumimoji="0" lang="es-CO" sz="3600" b="0" i="1" u="none" strike="noStrike" cap="none" spc="0" normalizeH="0" baseline="0" dirty="0">
+              <a:ln>
+                <a:noFill/>
+              </a:ln>
+              <a:solidFill>
+                <a:schemeClr val="bg1">
+                  <a:lumMod val="75000"/>
+                  <a:lumOff val="25000"/>
+                </a:schemeClr>
+              </a:solidFill>
+              <a:effectLst/>
+              <a:uFillTx/>
+              <a:latin typeface="Helvetica Neue"/>
+              <a:ea typeface="Helvetica Neue"/>
+              <a:cs typeface="Helvetica Neue"/>
+              <a:sym typeface="Helvetica Neue"/>
+            </a:endParaRPr>
           </a:p>
         </p:txBody>
       </p:sp>
@@ -2969,8 +3024,8 @@
         </p:nvSpPr>
         <p:spPr>
           <a:xfrm>
-            <a:off x="3982599" y="1828799"/>
-            <a:ext cx="18807272" cy="2201109"/>
+            <a:off x="4460179" y="2929353"/>
+            <a:ext cx="15463641" cy="2201109"/>
           </a:xfrm>
         </p:spPr>
         <p:txBody>
@@ -2979,17 +3034,6 @@
           </a:bodyPr>
           <a:lstStyle/>
           <a:p>
-            <a:r>
-              <a:rPr lang="es-ES" sz="9600" b="1" i="1" dirty="0" smtClean="0">
-                <a:solidFill>
-                  <a:schemeClr val="bg1">
-                    <a:lumMod val="85000"/>
-                    <a:lumOff val="15000"/>
-                  </a:schemeClr>
-                </a:solidFill>
-              </a:rPr>
-              <a:t>Sistemas </a:t>
-            </a:r>
             <a:r>
               <a:rPr lang="es-ES" sz="9600" b="1" i="1" dirty="0">
                 <a:solidFill>
@@ -2999,9 +3043,145 @@
                   </a:schemeClr>
                 </a:solidFill>
               </a:rPr>
-              <a:t>de integración continua</a:t>
+              <a:t>Sistemas de integración continua y repositorio</a:t>
             </a:r>
             <a:endParaRPr lang="es-ES" b="1" i="1" dirty="0"/>
+          </a:p>
+        </p:txBody>
+      </p:sp>
+      <p:sp>
+        <p:nvSpPr>
+          <p:cNvPr id="4" name="CuadroTexto 3">
+            <a:extLst>
+              <a:ext uri="{FF2B5EF4-FFF2-40B4-BE49-F238E27FC236}">
+                <a16:creationId xmlns:a16="http://schemas.microsoft.com/office/drawing/2014/main" id="{D1C8C0DB-2268-4350-9E01-43AD87BF9F88}"/>
+              </a:ext>
+            </a:extLst>
+          </p:cNvPr>
+          <p:cNvSpPr txBox="1"/>
+          <p:nvPr/>
+        </p:nvSpPr>
+        <p:spPr>
+          <a:xfrm>
+            <a:off x="10760519" y="7524866"/>
+            <a:ext cx="2862962" cy="698267"/>
+          </a:xfrm>
+          <a:prstGeom prst="rect">
+            <a:avLst/>
+          </a:prstGeom>
+          <a:noFill/>
+          <a:ln w="12700" cap="flat">
+            <a:noFill/>
+            <a:miter lim="400000"/>
+          </a:ln>
+          <a:effectLst/>
+          <a:sp3d/>
+        </p:spPr>
+        <p:style>
+          <a:lnRef idx="0">
+            <a:scrgbClr r="0" g="0" b="0"/>
+          </a:lnRef>
+          <a:fillRef idx="0">
+            <a:scrgbClr r="0" g="0" b="0"/>
+          </a:fillRef>
+          <a:effectRef idx="0">
+            <a:scrgbClr r="0" g="0" b="0"/>
+          </a:effectRef>
+          <a:fontRef idx="none"/>
+        </p:style>
+        <p:txBody>
+          <a:bodyPr rot="0" spcFirstLastPara="1" vertOverflow="overflow" horzOverflow="overflow" vert="horz" wrap="none" lIns="71437" tIns="71437" rIns="71437" bIns="71437" numCol="1" spcCol="38100" rtlCol="0" anchor="ctr">
+            <a:spAutoFit/>
+          </a:bodyPr>
+          <a:lstStyle/>
+          <a:p>
+            <a:pPr marL="0" marR="0" indent="0" defTabSz="943239" rtl="0" fontAlgn="auto" latinLnBrk="0" hangingPunct="0">
+              <a:lnSpc>
+                <a:spcPct val="100000"/>
+              </a:lnSpc>
+              <a:spcBef>
+                <a:spcPts val="0"/>
+              </a:spcBef>
+              <a:spcAft>
+                <a:spcPts val="0"/>
+              </a:spcAft>
+              <a:buClrTx/>
+              <a:buSzTx/>
+              <a:buFontTx/>
+              <a:buNone/>
+              <a:tabLst/>
+            </a:pPr>
+            <a:r>
+              <a:rPr kumimoji="0" lang="es-CO" sz="3600" b="0" i="0" u="none" strike="noStrike" cap="none" spc="0" normalizeH="0" baseline="0" dirty="0">
+                <a:ln>
+                  <a:noFill/>
+                </a:ln>
+                <a:solidFill>
+                  <a:schemeClr val="bg1">
+                    <a:lumMod val="75000"/>
+                    <a:lumOff val="25000"/>
+                  </a:schemeClr>
+                </a:solidFill>
+                <a:effectLst/>
+                <a:uFillTx/>
+                <a:latin typeface="Helvetica Neue"/>
+                <a:ea typeface="Helvetica Neue"/>
+                <a:cs typeface="Helvetica Neue"/>
+                <a:sym typeface="Helvetica Neue"/>
+                <a:hlinkClick r:id="rId4">
+                  <a:extLst>
+                    <a:ext uri="{A12FA001-AC4F-418D-AE19-62706E023703}">
+                      <ahyp:hlinkClr xmlns:ahyp="http://schemas.microsoft.com/office/drawing/2018/hyperlinkcolor" val="tx"/>
+                    </a:ext>
+                  </a:extLst>
+                </a:hlinkClick>
+              </a:rPr>
+              <a:t>Abrir </a:t>
+            </a:r>
+            <a:r>
+              <a:rPr kumimoji="0" lang="es-CO" sz="3600" b="0" i="1" u="none" strike="noStrike" cap="none" spc="0" normalizeH="0" baseline="0" dirty="0">
+                <a:ln>
+                  <a:noFill/>
+                </a:ln>
+                <a:solidFill>
+                  <a:schemeClr val="bg1">
+                    <a:lumMod val="75000"/>
+                    <a:lumOff val="25000"/>
+                  </a:schemeClr>
+                </a:solidFill>
+                <a:effectLst/>
+                <a:uFillTx/>
+                <a:latin typeface="Helvetica Neue"/>
+                <a:ea typeface="Helvetica Neue"/>
+                <a:cs typeface="Helvetica Neue"/>
+                <a:sym typeface="Helvetica Neue"/>
+                <a:hlinkClick r:id="rId4">
+                  <a:extLst>
+                    <a:ext uri="{A12FA001-AC4F-418D-AE19-62706E023703}">
+                      <ahyp:hlinkClr xmlns:ahyp="http://schemas.microsoft.com/office/drawing/2018/hyperlinkcolor" val="tx"/>
+                    </a:ext>
+                  </a:extLst>
+                </a:hlinkClick>
+              </a:rPr>
+              <a:t>archivo.</a:t>
+            </a:r>
+            <a:endParaRPr kumimoji="0" lang="es-CO" sz="3600" b="0" i="1" u="none" strike="noStrike" cap="none" spc="0" normalizeH="0" baseline="0" dirty="0">
+              <a:ln>
+                <a:noFill/>
+              </a:ln>
+              <a:solidFill>
+                <a:schemeClr val="bg1">
+                  <a:lumMod val="75000"/>
+                  <a:lumOff val="25000"/>
+                </a:schemeClr>
+              </a:solidFill>
+              <a:effectLst/>
+              <a:uFillTx/>
+              <a:latin typeface="Helvetica Neue"/>
+              <a:ea typeface="Helvetica Neue"/>
+              <a:cs typeface="Helvetica Neue"/>
+              <a:sym typeface="Helvetica Neue"/>
+            </a:endParaRPr>
           </a:p>
         </p:txBody>
       </p:sp>
@@ -3094,7 +3274,7 @@
           <a:lstStyle/>
           <a:p>
             <a:r>
-              <a:rPr lang="es-ES" sz="7200" b="1" i="1" dirty="0" smtClean="0">
+              <a:rPr lang="es-ES" sz="7200" b="1" i="1" dirty="0">
                 <a:solidFill>
                   <a:schemeClr val="bg1">
                     <a:lumMod val="85000"/>
@@ -3105,6 +3285,278 @@
               <a:t>Costos (Hardware – Software, GANTT PROJECT)</a:t>
             </a:r>
             <a:endParaRPr lang="es-ES" sz="7200" b="1" i="1" dirty="0"/>
+          </a:p>
+        </p:txBody>
+      </p:sp>
+      <p:sp>
+        <p:nvSpPr>
+          <p:cNvPr id="4" name="CuadroTexto 3">
+            <a:extLst>
+              <a:ext uri="{FF2B5EF4-FFF2-40B4-BE49-F238E27FC236}">
+                <a16:creationId xmlns:a16="http://schemas.microsoft.com/office/drawing/2014/main" id="{00D2574B-1DFF-4BD1-A90E-434C63F1662C}"/>
+              </a:ext>
+            </a:extLst>
+          </p:cNvPr>
+          <p:cNvSpPr txBox="1"/>
+          <p:nvPr/>
+        </p:nvSpPr>
+        <p:spPr>
+          <a:xfrm>
+            <a:off x="6828599" y="7393718"/>
+            <a:ext cx="2862962" cy="698267"/>
+          </a:xfrm>
+          <a:prstGeom prst="rect">
+            <a:avLst/>
+          </a:prstGeom>
+          <a:noFill/>
+          <a:ln w="12700" cap="flat">
+            <a:noFill/>
+            <a:miter lim="400000"/>
+          </a:ln>
+          <a:effectLst/>
+          <a:sp3d/>
+        </p:spPr>
+        <p:style>
+          <a:lnRef idx="0">
+            <a:scrgbClr r="0" g="0" b="0"/>
+          </a:lnRef>
+          <a:fillRef idx="0">
+            <a:scrgbClr r="0" g="0" b="0"/>
+          </a:fillRef>
+          <a:effectRef idx="0">
+            <a:scrgbClr r="0" g="0" b="0"/>
+          </a:effectRef>
+          <a:fontRef idx="none"/>
+        </p:style>
+        <p:txBody>
+          <a:bodyPr rot="0" spcFirstLastPara="1" vertOverflow="overflow" horzOverflow="overflow" vert="horz" wrap="none" lIns="71437" tIns="71437" rIns="71437" bIns="71437" numCol="1" spcCol="38100" rtlCol="0" anchor="ctr">
+            <a:spAutoFit/>
+          </a:bodyPr>
+          <a:lstStyle/>
+          <a:p>
+            <a:pPr marL="0" marR="0" indent="0" defTabSz="943239" rtl="0" fontAlgn="auto" latinLnBrk="0" hangingPunct="0">
+              <a:lnSpc>
+                <a:spcPct val="100000"/>
+              </a:lnSpc>
+              <a:spcBef>
+                <a:spcPts val="0"/>
+              </a:spcBef>
+              <a:spcAft>
+                <a:spcPts val="0"/>
+              </a:spcAft>
+              <a:buClrTx/>
+              <a:buSzTx/>
+              <a:buFontTx/>
+              <a:buNone/>
+              <a:tabLst/>
+            </a:pPr>
+            <a:r>
+              <a:rPr kumimoji="0" lang="es-CO" sz="3600" b="0" i="0" u="none" strike="noStrike" cap="none" spc="0" normalizeH="0" baseline="0" dirty="0">
+                <a:ln>
+                  <a:noFill/>
+                </a:ln>
+                <a:solidFill>
+                  <a:schemeClr val="bg1">
+                    <a:lumMod val="75000"/>
+                    <a:lumOff val="25000"/>
+                  </a:schemeClr>
+                </a:solidFill>
+                <a:effectLst/>
+                <a:uFillTx/>
+                <a:latin typeface="Helvetica Neue"/>
+                <a:ea typeface="Helvetica Neue"/>
+                <a:cs typeface="Helvetica Neue"/>
+                <a:sym typeface="Helvetica Neue"/>
+                <a:hlinkClick r:id="rId4" action="ppaction://hlinkfile">
+                  <a:extLst>
+                    <a:ext uri="{A12FA001-AC4F-418D-AE19-62706E023703}">
+                      <ahyp:hlinkClr xmlns:ahyp="http://schemas.microsoft.com/office/drawing/2018/hyperlinkcolor" val="tx"/>
+                    </a:ext>
+                  </a:extLst>
+                </a:hlinkClick>
+              </a:rPr>
+              <a:t>Abrir </a:t>
+            </a:r>
+            <a:r>
+              <a:rPr kumimoji="0" lang="es-CO" sz="3600" b="0" i="1" u="none" strike="noStrike" cap="none" spc="0" normalizeH="0" baseline="0" dirty="0">
+                <a:ln>
+                  <a:noFill/>
+                </a:ln>
+                <a:solidFill>
+                  <a:schemeClr val="bg1">
+                    <a:lumMod val="75000"/>
+                    <a:lumOff val="25000"/>
+                  </a:schemeClr>
+                </a:solidFill>
+                <a:effectLst/>
+                <a:uFillTx/>
+                <a:latin typeface="Helvetica Neue"/>
+                <a:ea typeface="Helvetica Neue"/>
+                <a:cs typeface="Helvetica Neue"/>
+                <a:sym typeface="Helvetica Neue"/>
+                <a:hlinkClick r:id="rId4" action="ppaction://hlinkfile">
+                  <a:extLst>
+                    <a:ext uri="{A12FA001-AC4F-418D-AE19-62706E023703}">
+                      <ahyp:hlinkClr xmlns:ahyp="http://schemas.microsoft.com/office/drawing/2018/hyperlinkcolor" val="tx"/>
+                    </a:ext>
+                  </a:extLst>
+                </a:hlinkClick>
+              </a:rPr>
+              <a:t>archivo.</a:t>
+            </a:r>
+            <a:endParaRPr kumimoji="0" lang="es-CO" sz="3600" b="0" i="1" u="none" strike="noStrike" cap="none" spc="0" normalizeH="0" baseline="0" dirty="0">
+              <a:ln>
+                <a:noFill/>
+              </a:ln>
+              <a:solidFill>
+                <a:schemeClr val="bg1">
+                  <a:lumMod val="75000"/>
+                  <a:lumOff val="25000"/>
+                </a:schemeClr>
+              </a:solidFill>
+              <a:effectLst/>
+              <a:uFillTx/>
+              <a:latin typeface="Helvetica Neue"/>
+              <a:ea typeface="Helvetica Neue"/>
+              <a:cs typeface="Helvetica Neue"/>
+              <a:sym typeface="Helvetica Neue"/>
+            </a:endParaRPr>
+          </a:p>
+        </p:txBody>
+      </p:sp>
+      <p:sp>
+        <p:nvSpPr>
+          <p:cNvPr id="5" name="CuadroTexto 4">
+            <a:extLst>
+              <a:ext uri="{FF2B5EF4-FFF2-40B4-BE49-F238E27FC236}">
+                <a16:creationId xmlns:a16="http://schemas.microsoft.com/office/drawing/2014/main" id="{8AEC4690-0D75-4339-82D9-4EC351FFD102}"/>
+              </a:ext>
+            </a:extLst>
+          </p:cNvPr>
+          <p:cNvSpPr txBox="1"/>
+          <p:nvPr/>
+        </p:nvSpPr>
+        <p:spPr>
+          <a:xfrm>
+            <a:off x="14936281" y="7363238"/>
+            <a:ext cx="2862962" cy="698267"/>
+          </a:xfrm>
+          <a:prstGeom prst="rect">
+            <a:avLst/>
+          </a:prstGeom>
+          <a:noFill/>
+          <a:ln w="12700" cap="flat">
+            <a:noFill/>
+            <a:miter lim="400000"/>
+          </a:ln>
+          <a:effectLst/>
+          <a:sp3d/>
+        </p:spPr>
+        <p:style>
+          <a:lnRef idx="0">
+            <a:scrgbClr r="0" g="0" b="0"/>
+          </a:lnRef>
+          <a:fillRef idx="0">
+            <a:scrgbClr r="0" g="0" b="0"/>
+          </a:fillRef>
+          <a:effectRef idx="0">
+            <a:scrgbClr r="0" g="0" b="0"/>
+          </a:effectRef>
+          <a:fontRef idx="none"/>
+        </p:style>
+        <p:txBody>
+          <a:bodyPr rot="0" spcFirstLastPara="1" vertOverflow="overflow" horzOverflow="overflow" vert="horz" wrap="none" lIns="71437" tIns="71437" rIns="71437" bIns="71437" numCol="1" spcCol="38100" rtlCol="0" anchor="ctr">
+            <a:spAutoFit/>
+          </a:bodyPr>
+          <a:lstStyle/>
+          <a:p>
+            <a:pPr marL="0" marR="0" indent="0" defTabSz="943239" rtl="0" fontAlgn="auto" latinLnBrk="0" hangingPunct="0">
+              <a:lnSpc>
+                <a:spcPct val="100000"/>
+              </a:lnSpc>
+              <a:spcBef>
+                <a:spcPts val="0"/>
+              </a:spcBef>
+              <a:spcAft>
+                <a:spcPts val="0"/>
+              </a:spcAft>
+              <a:buClrTx/>
+              <a:buSzTx/>
+              <a:buFontTx/>
+              <a:buNone/>
+              <a:tabLst/>
+            </a:pPr>
+            <a:r>
+              <a:rPr kumimoji="0" lang="es-CO" sz="3600" b="0" i="0" u="none" strike="noStrike" cap="none" spc="0" normalizeH="0" baseline="0" dirty="0">
+                <a:ln>
+                  <a:noFill/>
+                </a:ln>
+                <a:solidFill>
+                  <a:schemeClr val="bg1">
+                    <a:lumMod val="75000"/>
+                    <a:lumOff val="25000"/>
+                  </a:schemeClr>
+                </a:solidFill>
+                <a:effectLst/>
+                <a:uFillTx/>
+                <a:latin typeface="Helvetica Neue"/>
+                <a:ea typeface="Helvetica Neue"/>
+                <a:cs typeface="Helvetica Neue"/>
+                <a:sym typeface="Helvetica Neue"/>
+                <a:hlinkClick r:id="rId5" action="ppaction://hlinkfile">
+                  <a:extLst>
+                    <a:ext uri="{A12FA001-AC4F-418D-AE19-62706E023703}">
+                      <ahyp:hlinkClr xmlns:ahyp="http://schemas.microsoft.com/office/drawing/2018/hyperlinkcolor" val="tx"/>
+                    </a:ext>
+                  </a:extLst>
+                </a:hlinkClick>
+              </a:rPr>
+              <a:t>Abrir </a:t>
+            </a:r>
+            <a:r>
+              <a:rPr kumimoji="0" lang="es-CO" sz="3600" b="0" i="1" u="none" strike="noStrike" cap="none" spc="0" normalizeH="0" baseline="0" dirty="0">
+                <a:ln>
+                  <a:noFill/>
+                </a:ln>
+                <a:solidFill>
+                  <a:schemeClr val="bg1">
+                    <a:lumMod val="75000"/>
+                    <a:lumOff val="25000"/>
+                  </a:schemeClr>
+                </a:solidFill>
+                <a:effectLst/>
+                <a:uFillTx/>
+                <a:latin typeface="Helvetica Neue"/>
+                <a:ea typeface="Helvetica Neue"/>
+                <a:cs typeface="Helvetica Neue"/>
+                <a:sym typeface="Helvetica Neue"/>
+                <a:hlinkClick r:id="rId5" action="ppaction://hlinkfile">
+                  <a:extLst>
+                    <a:ext uri="{A12FA001-AC4F-418D-AE19-62706E023703}">
+                      <ahyp:hlinkClr xmlns:ahyp="http://schemas.microsoft.com/office/drawing/2018/hyperlinkcolor" val="tx"/>
+                    </a:ext>
+                  </a:extLst>
+                </a:hlinkClick>
+              </a:rPr>
+              <a:t>archivo.</a:t>
+            </a:r>
+            <a:endParaRPr kumimoji="0" lang="es-CO" sz="3600" b="0" i="1" u="none" strike="noStrike" cap="none" spc="0" normalizeH="0" baseline="0" dirty="0">
+              <a:ln>
+                <a:noFill/>
+              </a:ln>
+              <a:solidFill>
+                <a:schemeClr val="bg1">
+                  <a:lumMod val="75000"/>
+                  <a:lumOff val="25000"/>
+                </a:schemeClr>
+              </a:solidFill>
+              <a:effectLst/>
+              <a:uFillTx/>
+              <a:latin typeface="Helvetica Neue"/>
+              <a:ea typeface="Helvetica Neue"/>
+              <a:cs typeface="Helvetica Neue"/>
+              <a:sym typeface="Helvetica Neue"/>
+            </a:endParaRPr>
           </a:p>
         </p:txBody>
       </p:sp>
@@ -3166,7 +3618,7 @@
           <a:lstStyle/>
           <a:p>
             <a:r>
-              <a:rPr lang="es-ES" i="1" dirty="0" smtClean="0">
+              <a:rPr lang="es-ES" i="1" dirty="0">
                 <a:solidFill>
                   <a:schemeClr val="bg1">
                     <a:lumMod val="65000"/>
@@ -3176,14 +3628,6 @@
               </a:rPr>
               <a:t>!Eso es todo!</a:t>
             </a:r>
-            <a:endParaRPr lang="es-ES" i="1" dirty="0">
-              <a:solidFill>
-                <a:schemeClr val="bg1">
-                  <a:lumMod val="65000"/>
-                  <a:lumOff val="35000"/>
-                </a:schemeClr>
-              </a:solidFill>
-            </a:endParaRPr>
           </a:p>
         </p:txBody>
       </p:sp>
@@ -3203,7 +3647,7 @@
           <a:lstStyle/>
           <a:p>
             <a:r>
-              <a:rPr lang="es-ES" b="1" i="1" dirty="0" smtClean="0">
+              <a:rPr lang="es-ES" b="1" i="1" dirty="0">
                 <a:solidFill>
                   <a:schemeClr val="bg1">
                     <a:lumMod val="65000"/>
@@ -3213,14 +3657,6 @@
               </a:rPr>
               <a:t>Gracias por su atención.</a:t>
             </a:r>
-            <a:endParaRPr lang="es-ES" b="1" i="1" dirty="0">
-              <a:solidFill>
-                <a:schemeClr val="bg1">
-                  <a:lumMod val="65000"/>
-                  <a:lumOff val="35000"/>
-                </a:schemeClr>
-              </a:solidFill>
-            </a:endParaRPr>
           </a:p>
         </p:txBody>
       </p:sp>
@@ -3252,124 +3688,6 @@
     <p:extLst>
       <p:ext uri="{BB962C8B-B14F-4D97-AF65-F5344CB8AC3E}">
         <p14:creationId xmlns:p14="http://schemas.microsoft.com/office/powerpoint/2010/main" val="2459470141"/>
-      </p:ext>
-    </p:extLst>
-  </p:cSld>
-  <p:clrMapOvr>
-    <a:masterClrMapping/>
-  </p:clrMapOvr>
-  <p:transition spd="med"/>
-</p:sld>
-</file>
-
-<file path=ppt/slides/slide14.xml><?xml version="1.0" encoding="utf-8"?>
-<p:sld xmlns:a="http://schemas.openxmlformats.org/drawingml/2006/main" xmlns:r="http://schemas.openxmlformats.org/officeDocument/2006/relationships" xmlns:p="http://schemas.openxmlformats.org/presentationml/2006/main">
-  <p:cSld>
-    <p:bg>
-      <p:bgPr>
-        <a:blipFill rotWithShape="1">
-          <a:blip r:embed="rId2"/>
-          <a:stretch>
-            <a:fillRect/>
-          </a:stretch>
-        </a:blipFill>
-        <a:effectLst/>
-      </p:bgPr>
-    </p:bg>
-    <p:spTree>
-      <p:nvGrpSpPr>
-        <p:cNvPr id="1" name=""/>
-        <p:cNvGrpSpPr/>
-        <p:nvPr/>
-      </p:nvGrpSpPr>
-      <p:grpSpPr>
-        <a:xfrm>
-          <a:off x="0" y="0"/>
-          <a:ext cx="0" cy="0"/>
-          <a:chOff x="0" y="0"/>
-          <a:chExt cx="0" cy="0"/>
-        </a:xfrm>
-      </p:grpSpPr>
-      <p:sp>
-        <p:nvSpPr>
-          <p:cNvPr id="3" name="CuadroTexto 2"/>
-          <p:cNvSpPr txBox="1"/>
-          <p:nvPr/>
-        </p:nvSpPr>
-        <p:spPr>
-          <a:xfrm>
-            <a:off x="4944042" y="4039986"/>
-            <a:ext cx="3888885" cy="698267"/>
-          </a:xfrm>
-          <a:prstGeom prst="rect">
-            <a:avLst/>
-          </a:prstGeom>
-          <a:noFill/>
-          <a:ln w="12700" cap="flat">
-            <a:noFill/>
-            <a:miter lim="400000"/>
-          </a:ln>
-          <a:effectLst/>
-          <a:sp3d/>
-        </p:spPr>
-        <p:style>
-          <a:lnRef idx="0">
-            <a:scrgbClr r="0" g="0" b="0"/>
-          </a:lnRef>
-          <a:fillRef idx="0">
-            <a:scrgbClr r="0" g="0" b="0"/>
-          </a:fillRef>
-          <a:effectRef idx="0">
-            <a:scrgbClr r="0" g="0" b="0"/>
-          </a:effectRef>
-          <a:fontRef idx="none"/>
-        </p:style>
-        <p:txBody>
-          <a:bodyPr rot="0" spcFirstLastPara="1" vertOverflow="overflow" horzOverflow="overflow" vert="horz" wrap="none" lIns="71437" tIns="71437" rIns="71437" bIns="71437" numCol="1" spcCol="38100" rtlCol="0" anchor="ctr">
-            <a:spAutoFit/>
-          </a:bodyPr>
-          <a:lstStyle/>
-          <a:p>
-            <a:pPr marL="0" marR="0" indent="0" algn="ctr" defTabSz="943239" rtl="0" fontAlgn="auto" latinLnBrk="0" hangingPunct="0">
-              <a:lnSpc>
-                <a:spcPct val="100000"/>
-              </a:lnSpc>
-              <a:spcBef>
-                <a:spcPts val="0"/>
-              </a:spcBef>
-              <a:spcAft>
-                <a:spcPts val="0"/>
-              </a:spcAft>
-              <a:buClrTx/>
-              <a:buSzTx/>
-              <a:buFontTx/>
-              <a:buNone/>
-              <a:tabLst/>
-            </a:pPr>
-            <a:r>
-              <a:rPr kumimoji="0" lang="es-CO" sz="3600" b="1" i="0" u="none" strike="noStrike" cap="none" spc="0" normalizeH="0" baseline="0" dirty="0">
-                <a:ln>
-                  <a:noFill/>
-                </a:ln>
-                <a:solidFill>
-                  <a:srgbClr val="FFFFFF"/>
-                </a:solidFill>
-                <a:effectLst/>
-                <a:uFillTx/>
-                <a:latin typeface="Helvetica Neue"/>
-                <a:ea typeface="Helvetica Neue"/>
-                <a:cs typeface="Helvetica Neue"/>
-                <a:sym typeface="Helvetica Neue"/>
-              </a:rPr>
-              <a:t>Agradecimientos</a:t>
-            </a:r>
-          </a:p>
-        </p:txBody>
-      </p:sp>
-    </p:spTree>
-    <p:extLst>
-      <p:ext uri="{BB962C8B-B14F-4D97-AF65-F5344CB8AC3E}">
-        <p14:creationId xmlns:p14="http://schemas.microsoft.com/office/powerpoint/2010/main" val="2682191985"/>
       </p:ext>
     </p:extLst>
   </p:cSld>
@@ -3458,19 +3776,6 @@
                 <a:latin typeface="Calibri" panose="020F0502020204030204" pitchFamily="34" charset="0"/>
               </a:rPr>
               <a:t>Proyecto formativo</a:t>
-            </a:r>
-            <a:r>
-              <a:rPr lang="es-CO" sz="8800" b="1" i="1" dirty="0">
-                <a:solidFill>
-                  <a:schemeClr val="bg1">
-                    <a:lumMod val="85000"/>
-                    <a:lumOff val="15000"/>
-                  </a:schemeClr>
-                </a:solidFill>
-                <a:latin typeface="Calibri" panose="020F0502020204030204" pitchFamily="34" charset="0"/>
-                <a:sym typeface="Helvetica Neue"/>
-              </a:rPr>
-              <a:t/>
             </a:r>
             <a:br>
               <a:rPr lang="es-CO" sz="8800" b="1" i="1" dirty="0">
@@ -3706,17 +4011,6 @@
               <a:buAutoNum type="arabicPeriod"/>
             </a:pPr>
             <a:r>
-              <a:rPr lang="es-ES" sz="4000" dirty="0" smtClean="0">
-                <a:solidFill>
-                  <a:schemeClr val="bg1">
-                    <a:lumMod val="85000"/>
-                    <a:lumOff val="15000"/>
-                  </a:schemeClr>
-                </a:solidFill>
-              </a:rPr>
-              <a:t>Construcción </a:t>
-            </a:r>
-            <a:r>
               <a:rPr lang="es-ES" sz="4000" dirty="0">
                 <a:solidFill>
                   <a:schemeClr val="bg1">
@@ -3725,18 +4019,7 @@
                   </a:schemeClr>
                 </a:solidFill>
               </a:rPr>
-              <a:t>de la base de datos usando sentencias DDL.</a:t>
-            </a:r>
-            <a:r>
-              <a:rPr lang="es-CO" sz="4000" dirty="0" smtClean="0">
-                <a:solidFill>
-                  <a:schemeClr val="bg1">
-                    <a:lumMod val="85000"/>
-                    <a:lumOff val="15000"/>
-                  </a:schemeClr>
-                </a:solidFill>
-              </a:rPr>
-              <a:t>Diccionario </a:t>
+              <a:t>Construcción de la base de datos usando sentencias DDL.</a:t>
             </a:r>
             <a:r>
               <a:rPr lang="es-CO" sz="4000" dirty="0">
@@ -3747,44 +4030,14 @@
                   </a:schemeClr>
                 </a:solidFill>
               </a:rPr>
-              <a:t>de </a:t>
-            </a:r>
-            <a:r>
-              <a:rPr lang="es-CO" sz="4000" dirty="0" smtClean="0">
-                <a:solidFill>
-                  <a:schemeClr val="bg1">
-                    <a:lumMod val="85000"/>
-                    <a:lumOff val="15000"/>
-                  </a:schemeClr>
-                </a:solidFill>
-              </a:rPr>
-              <a:t>datos.</a:t>
-            </a:r>
-            <a:endParaRPr lang="es-CO" sz="4000" dirty="0">
-              <a:solidFill>
-                <a:schemeClr val="bg1">
-                  <a:lumMod val="85000"/>
-                  <a:lumOff val="15000"/>
-                </a:schemeClr>
-              </a:solidFill>
-            </a:endParaRPr>
+              <a:t>Diccionario de datos.</a:t>
+            </a:r>
           </a:p>
           <a:p>
             <a:pPr marL="914400" lvl="2" indent="-914400" algn="l">
               <a:buFont typeface="+mj-lt"/>
               <a:buAutoNum type="arabicPeriod"/>
             </a:pPr>
-            <a:r>
-              <a:rPr lang="es-ES" sz="4000" dirty="0" smtClean="0">
-                <a:solidFill>
-                  <a:schemeClr val="bg1">
-                    <a:lumMod val="85000"/>
-                    <a:lumOff val="15000"/>
-                  </a:schemeClr>
-                </a:solidFill>
-              </a:rPr>
-              <a:t>Uso </a:t>
-            </a:r>
             <a:r>
               <a:rPr lang="es-ES" sz="4000" dirty="0">
                 <a:solidFill>
@@ -3794,7 +4047,7 @@
                   </a:schemeClr>
                 </a:solidFill>
               </a:rPr>
-              <a:t>de la base de datos revisando que hayan datos insertados y sus respectivos consultas y </a:t>
+              <a:t>Uso de la base de datos revisando que hayan datos insertados y sus respectivos consultas y </a:t>
             </a:r>
             <a:r>
               <a:rPr lang="es-ES" sz="4000" dirty="0" err="1">
@@ -3819,17 +4072,6 @@
               <a:t> usando sentencias DML.</a:t>
             </a:r>
             <a:r>
-              <a:rPr lang="es-CO" sz="4000" dirty="0" smtClean="0">
-                <a:solidFill>
-                  <a:schemeClr val="bg1">
-                    <a:lumMod val="85000"/>
-                    <a:lumOff val="15000"/>
-                  </a:schemeClr>
-                </a:solidFill>
-              </a:rPr>
-              <a:t>Diagrama </a:t>
-            </a:r>
-            <a:r>
               <a:rPr lang="es-CO" sz="4000" dirty="0">
                 <a:solidFill>
                   <a:schemeClr val="bg1">
@@ -3838,44 +4080,14 @@
                   </a:schemeClr>
                 </a:solidFill>
               </a:rPr>
-              <a:t>de </a:t>
-            </a:r>
-            <a:r>
-              <a:rPr lang="es-CO" sz="4000" dirty="0" smtClean="0">
-                <a:solidFill>
-                  <a:schemeClr val="bg1">
-                    <a:lumMod val="85000"/>
-                    <a:lumOff val="15000"/>
-                  </a:schemeClr>
-                </a:solidFill>
-              </a:rPr>
-              <a:t>distribución.</a:t>
-            </a:r>
-            <a:endParaRPr lang="es-CO" sz="4000" dirty="0">
-              <a:solidFill>
-                <a:schemeClr val="bg1">
-                  <a:lumMod val="85000"/>
-                  <a:lumOff val="15000"/>
-                </a:schemeClr>
-              </a:solidFill>
-            </a:endParaRPr>
+              <a:t>Diagrama de distribución.</a:t>
+            </a:r>
           </a:p>
           <a:p>
             <a:pPr marL="914400" lvl="2" indent="-914400" algn="l">
               <a:buFont typeface="+mj-lt"/>
               <a:buAutoNum type="arabicPeriod"/>
             </a:pPr>
-            <a:r>
-              <a:rPr lang="es-CO" sz="4000" dirty="0" smtClean="0">
-                <a:solidFill>
-                  <a:schemeClr val="bg1">
-                    <a:lumMod val="85000"/>
-                    <a:lumOff val="15000"/>
-                  </a:schemeClr>
-                </a:solidFill>
-              </a:rPr>
-              <a:t>Prototipo </a:t>
-            </a:r>
             <a:r>
               <a:rPr lang="es-CO" sz="4000" dirty="0">
                 <a:solidFill>
@@ -3885,7 +4097,7 @@
                   </a:schemeClr>
                 </a:solidFill>
               </a:rPr>
-              <a:t>no funcional usando CSS a partir de un </a:t>
+              <a:t>Prototipo no funcional usando CSS a partir de un </a:t>
             </a:r>
             <a:r>
               <a:rPr lang="es-CO" sz="4000" dirty="0" err="1">
@@ -3910,7 +4122,7 @@
               <a:t> o </a:t>
             </a:r>
             <a:r>
-              <a:rPr lang="es-CO" sz="4000" dirty="0" err="1" smtClean="0">
+              <a:rPr lang="es-CO" sz="4000" dirty="0" err="1">
                 <a:solidFill>
                   <a:schemeClr val="bg1">
                     <a:lumMod val="85000"/>
@@ -3921,7 +4133,7 @@
               <a:t>wireframe</a:t>
             </a:r>
             <a:r>
-              <a:rPr lang="es-CO" sz="4000" dirty="0" smtClean="0">
+              <a:rPr lang="es-CO" sz="4000" dirty="0">
                 <a:solidFill>
                   <a:schemeClr val="bg1">
                     <a:lumMod val="85000"/>
@@ -3938,17 +4150,6 @@
               <a:buAutoNum type="arabicPeriod"/>
             </a:pPr>
             <a:r>
-              <a:rPr lang="es-ES" sz="4000" dirty="0" smtClean="0">
-                <a:solidFill>
-                  <a:schemeClr val="bg1">
-                    <a:lumMod val="85000"/>
-                    <a:lumOff val="15000"/>
-                  </a:schemeClr>
-                </a:solidFill>
-              </a:rPr>
-              <a:t>Inventario </a:t>
-            </a:r>
-            <a:r>
               <a:rPr lang="es-ES" sz="4000" dirty="0">
                 <a:solidFill>
                   <a:schemeClr val="bg1">
@@ -3957,18 +4158,7 @@
                   </a:schemeClr>
                 </a:solidFill>
               </a:rPr>
-              <a:t>donde se va a implementar el sistema de información</a:t>
-            </a:r>
-            <a:r>
-              <a:rPr lang="es-ES" sz="4000" dirty="0" smtClean="0">
-                <a:solidFill>
-                  <a:schemeClr val="bg1">
-                    <a:lumMod val="85000"/>
-                    <a:lumOff val="15000"/>
-                  </a:schemeClr>
-                </a:solidFill>
-              </a:rPr>
-              <a:t>.</a:t>
+              <a:t>Inventario donde se va a implementar el sistema de información.</a:t>
             </a:r>
           </a:p>
           <a:p>
@@ -3976,17 +4166,6 @@
               <a:buFont typeface="+mj-lt"/>
               <a:buAutoNum type="arabicPeriod"/>
             </a:pPr>
-            <a:r>
-              <a:rPr lang="es-ES" sz="4000" dirty="0" smtClean="0">
-                <a:solidFill>
-                  <a:schemeClr val="bg1">
-                    <a:lumMod val="85000"/>
-                    <a:lumOff val="15000"/>
-                  </a:schemeClr>
-                </a:solidFill>
-              </a:rPr>
-              <a:t>Uso </a:t>
-            </a:r>
             <a:r>
               <a:rPr lang="es-ES" sz="4000" dirty="0">
                 <a:solidFill>
@@ -3996,18 +4175,7 @@
                   </a:schemeClr>
                 </a:solidFill>
               </a:rPr>
-              <a:t>de sistemas de integración </a:t>
-            </a:r>
-            <a:r>
-              <a:rPr lang="es-ES" sz="4000" dirty="0" smtClean="0">
-                <a:solidFill>
-                  <a:schemeClr val="bg1">
-                    <a:lumMod val="85000"/>
-                    <a:lumOff val="15000"/>
-                  </a:schemeClr>
-                </a:solidFill>
-              </a:rPr>
-              <a:t>continua.</a:t>
+              <a:t>Uso de sistemas de integración continua.</a:t>
             </a:r>
           </a:p>
           <a:p>
@@ -4015,17 +4183,6 @@
               <a:buFont typeface="+mj-lt"/>
               <a:buAutoNum type="arabicPeriod"/>
             </a:pPr>
-            <a:r>
-              <a:rPr lang="es-ES" sz="4000" dirty="0" smtClean="0">
-                <a:solidFill>
-                  <a:schemeClr val="bg1">
-                    <a:lumMod val="85000"/>
-                    <a:lumOff val="15000"/>
-                  </a:schemeClr>
-                </a:solidFill>
-              </a:rPr>
-              <a:t>Informe </a:t>
-            </a:r>
             <a:r>
               <a:rPr lang="es-ES" sz="4000" dirty="0">
                 <a:solidFill>
@@ -4035,18 +4192,7 @@
                   </a:schemeClr>
                 </a:solidFill>
               </a:rPr>
-              <a:t>de costos que dependen de hardware y el </a:t>
-            </a:r>
-            <a:r>
-              <a:rPr lang="es-ES" sz="4000" dirty="0" smtClean="0">
-                <a:solidFill>
-                  <a:schemeClr val="bg1">
-                    <a:lumMod val="85000"/>
-                    <a:lumOff val="15000"/>
-                  </a:schemeClr>
-                </a:solidFill>
-              </a:rPr>
-              <a:t>software, (GANTT PROJECT).</a:t>
+              <a:t>Informe de costos que dependen de hardware y el software, (GANTT PROJECT).</a:t>
             </a:r>
           </a:p>
           <a:p>
@@ -4173,19 +4319,6 @@
               </a:rPr>
               <a:t>Planteamiento del problema</a:t>
             </a:r>
-            <a:r>
-              <a:rPr lang="es-CO" b="1" dirty="0">
-                <a:solidFill>
-                  <a:schemeClr val="bg1">
-                    <a:lumMod val="85000"/>
-                    <a:lumOff val="15000"/>
-                  </a:schemeClr>
-                </a:solidFill>
-                <a:latin typeface="Calibri" panose="020F0502020204030204" pitchFamily="34" charset="0"/>
-                <a:sym typeface="Helvetica Neue"/>
-              </a:rPr>
-              <a:t/>
-            </a:r>
             <a:br>
               <a:rPr lang="es-CO" b="1" dirty="0">
                 <a:solidFill>
@@ -4341,19 +4474,6 @@
               </a:rPr>
               <a:t>Objetivo general</a:t>
             </a:r>
-            <a:r>
-              <a:rPr lang="es-CO" b="1" dirty="0">
-                <a:solidFill>
-                  <a:schemeClr val="bg1">
-                    <a:lumMod val="85000"/>
-                    <a:lumOff val="15000"/>
-                  </a:schemeClr>
-                </a:solidFill>
-                <a:latin typeface="Calibri" panose="020F0502020204030204" pitchFamily="34" charset="0"/>
-                <a:sym typeface="Helvetica Neue"/>
-              </a:rPr>
-              <a:t/>
-            </a:r>
             <a:br>
               <a:rPr lang="es-CO" b="1" dirty="0">
                 <a:solidFill>
@@ -4527,19 +4647,6 @@
               </a:rPr>
               <a:t>Alcance</a:t>
             </a:r>
-            <a:r>
-              <a:rPr lang="es-CO" b="1" dirty="0">
-                <a:solidFill>
-                  <a:schemeClr val="bg1">
-                    <a:lumMod val="85000"/>
-                    <a:lumOff val="15000"/>
-                  </a:schemeClr>
-                </a:solidFill>
-                <a:latin typeface="Calibri" panose="020F0502020204030204" pitchFamily="34" charset="0"/>
-                <a:sym typeface="Helvetica Neue"/>
-              </a:rPr>
-              <a:t/>
-            </a:r>
             <a:br>
               <a:rPr lang="es-CO" b="1" dirty="0">
                 <a:solidFill>
@@ -4679,30 +4786,166 @@
           </a:xfrm>
         </p:spPr>
         <p:txBody>
-          <a:bodyPr/>
+          <a:bodyPr>
+            <a:normAutofit/>
+          </a:bodyPr>
           <a:lstStyle/>
           <a:p>
             <a:r>
-              <a:rPr lang="es-CO" b="1" i="1" dirty="0" smtClean="0">
+              <a:rPr lang="es-ES" sz="9600" b="1" i="1" dirty="0">
                 <a:solidFill>
                   <a:schemeClr val="bg1">
                     <a:lumMod val="85000"/>
                     <a:lumOff val="15000"/>
                   </a:schemeClr>
                 </a:solidFill>
-                <a:latin typeface="Calibri" panose="020F0502020204030204" pitchFamily="34" charset="0"/>
+              </a:rPr>
+              <a:t>Consultas DDL.</a:t>
+            </a:r>
+            <a:endParaRPr lang="es-ES" b="1" i="1" dirty="0"/>
+          </a:p>
+        </p:txBody>
+      </p:sp>
+      <p:sp>
+        <p:nvSpPr>
+          <p:cNvPr id="4" name="CuadroTexto 3">
+            <a:extLst>
+              <a:ext uri="{FF2B5EF4-FFF2-40B4-BE49-F238E27FC236}">
+                <a16:creationId xmlns:a16="http://schemas.microsoft.com/office/drawing/2014/main" id="{ABA2827B-5A50-41AC-91DD-82EDA05810BB}"/>
+              </a:ext>
+            </a:extLst>
+          </p:cNvPr>
+          <p:cNvSpPr txBox="1"/>
+          <p:nvPr/>
+        </p:nvSpPr>
+        <p:spPr>
+          <a:xfrm>
+            <a:off x="10760519" y="7622663"/>
+            <a:ext cx="2862962" cy="698267"/>
+          </a:xfrm>
+          <a:prstGeom prst="rect">
+            <a:avLst/>
+          </a:prstGeom>
+          <a:noFill/>
+          <a:ln w="12700" cap="flat">
+            <a:noFill/>
+            <a:miter lim="400000"/>
+          </a:ln>
+          <a:effectLst/>
+          <a:sp3d/>
+        </p:spPr>
+        <p:style>
+          <a:lnRef idx="0">
+            <a:scrgbClr r="0" g="0" b="0"/>
+          </a:lnRef>
+          <a:fillRef idx="0">
+            <a:scrgbClr r="0" g="0" b="0"/>
+          </a:fillRef>
+          <a:effectRef idx="0">
+            <a:scrgbClr r="0" g="0" b="0"/>
+          </a:effectRef>
+          <a:fontRef idx="none"/>
+        </p:style>
+        <p:txBody>
+          <a:bodyPr rot="0" spcFirstLastPara="1" vertOverflow="overflow" horzOverflow="overflow" vert="horz" wrap="none" lIns="71437" tIns="71437" rIns="71437" bIns="71437" numCol="1" spcCol="38100" rtlCol="0" anchor="ctr">
+            <a:spAutoFit/>
+          </a:bodyPr>
+          <a:lstStyle/>
+          <a:p>
+            <a:pPr marL="0" marR="0" indent="0" defTabSz="943239" rtl="0" fontAlgn="auto" latinLnBrk="0" hangingPunct="0">
+              <a:lnSpc>
+                <a:spcPct val="100000"/>
+              </a:lnSpc>
+              <a:spcBef>
+                <a:spcPts val="0"/>
+              </a:spcBef>
+              <a:spcAft>
+                <a:spcPts val="0"/>
+              </a:spcAft>
+              <a:buClrTx/>
+              <a:buSzTx/>
+              <a:buFontTx/>
+              <a:buNone/>
+              <a:tabLst/>
+            </a:pPr>
+            <a:r>
+              <a:rPr kumimoji="0" lang="es-CO" sz="3600" b="0" i="0" u="none" strike="noStrike" cap="none" spc="0" normalizeH="0" baseline="0" dirty="0">
+                <a:ln>
+                  <a:noFill/>
+                </a:ln>
+                <a:solidFill>
+                  <a:schemeClr val="bg1">
+                    <a:lumMod val="75000"/>
+                    <a:lumOff val="25000"/>
+                  </a:schemeClr>
+                </a:solidFill>
+                <a:effectLst/>
+                <a:uFillTx/>
+                <a:latin typeface="Helvetica Neue"/>
+                <a:ea typeface="Helvetica Neue"/>
+                <a:cs typeface="Helvetica Neue"/>
                 <a:sym typeface="Helvetica Neue"/>
+                <a:hlinkClick r:id="rId4" action="ppaction://hlinkfile">
+                  <a:extLst>
+                    <a:ext uri="{A12FA001-AC4F-418D-AE19-62706E023703}">
+                      <ahyp:hlinkClr xmlns:ahyp="http://schemas.microsoft.com/office/drawing/2018/hyperlinkcolor" val="tx"/>
+                    </a:ext>
+                  </a:extLst>
+                </a:hlinkClick>
               </a:rPr>
-              <a:t>DICCIONARIO DE DATOS</a:t>
-            </a:r>
-            <a:endParaRPr lang="es-ES" dirty="0"/>
+              <a:t>Abrir </a:t>
+            </a:r>
+            <a:r>
+              <a:rPr kumimoji="0" lang="es-CO" sz="3600" b="0" i="1" u="none" strike="noStrike" cap="none" spc="0" normalizeH="0" baseline="0" dirty="0">
+                <a:ln>
+                  <a:noFill/>
+                </a:ln>
+                <a:solidFill>
+                  <a:schemeClr val="bg1">
+                    <a:lumMod val="75000"/>
+                    <a:lumOff val="25000"/>
+                  </a:schemeClr>
+                </a:solidFill>
+                <a:effectLst/>
+                <a:uFillTx/>
+                <a:latin typeface="Helvetica Neue"/>
+                <a:ea typeface="Helvetica Neue"/>
+                <a:cs typeface="Helvetica Neue"/>
+                <a:sym typeface="Helvetica Neue"/>
+                <a:hlinkClick r:id="rId4" action="ppaction://hlinkfile">
+                  <a:extLst>
+                    <a:ext uri="{A12FA001-AC4F-418D-AE19-62706E023703}">
+                      <ahyp:hlinkClr xmlns:ahyp="http://schemas.microsoft.com/office/drawing/2018/hyperlinkcolor" val="tx"/>
+                    </a:ext>
+                  </a:extLst>
+                </a:hlinkClick>
+              </a:rPr>
+              <a:t>archivo.</a:t>
+            </a:r>
+            <a:endParaRPr kumimoji="0" lang="es-CO" sz="3600" b="0" i="1" u="none" strike="noStrike" cap="none" spc="0" normalizeH="0" baseline="0" dirty="0">
+              <a:ln>
+                <a:noFill/>
+              </a:ln>
+              <a:solidFill>
+                <a:schemeClr val="bg1">
+                  <a:lumMod val="75000"/>
+                  <a:lumOff val="25000"/>
+                </a:schemeClr>
+              </a:solidFill>
+              <a:effectLst/>
+              <a:uFillTx/>
+              <a:latin typeface="Helvetica Neue"/>
+              <a:ea typeface="Helvetica Neue"/>
+              <a:cs typeface="Helvetica Neue"/>
+              <a:sym typeface="Helvetica Neue"/>
+            </a:endParaRPr>
           </a:p>
         </p:txBody>
       </p:sp>
     </p:spTree>
     <p:extLst>
       <p:ext uri="{BB962C8B-B14F-4D97-AF65-F5344CB8AC3E}">
-        <p14:creationId xmlns:p14="http://schemas.microsoft.com/office/powerpoint/2010/main" val="4043803721"/>
+        <p14:creationId xmlns:p14="http://schemas.microsoft.com/office/powerpoint/2010/main" val="3142486631"/>
       </p:ext>
     </p:extLst>
   </p:cSld>
@@ -4788,17 +5031,6 @@
           <a:lstStyle/>
           <a:p>
             <a:r>
-              <a:rPr lang="es-ES" sz="9600" b="1" i="1" dirty="0" smtClean="0">
-                <a:solidFill>
-                  <a:schemeClr val="bg1">
-                    <a:lumMod val="85000"/>
-                    <a:lumOff val="15000"/>
-                  </a:schemeClr>
-                </a:solidFill>
-              </a:rPr>
-              <a:t>BD, consultas </a:t>
-            </a:r>
-            <a:r>
               <a:rPr lang="es-ES" sz="9600" b="1" i="1" dirty="0">
                 <a:solidFill>
                   <a:schemeClr val="bg1">
@@ -4807,60 +5039,152 @@
                   </a:schemeClr>
                 </a:solidFill>
               </a:rPr>
-              <a:t>y </a:t>
-            </a:r>
-            <a:r>
-              <a:rPr lang="es-ES" sz="9600" b="1" i="1" dirty="0" err="1">
+              <a:t>Consultas DML.</a:t>
+            </a:r>
+            <a:endParaRPr lang="es-ES" b="1" i="1" dirty="0"/>
+          </a:p>
+        </p:txBody>
+      </p:sp>
+      <p:sp>
+        <p:nvSpPr>
+          <p:cNvPr id="4" name="CuadroTexto 3">
+            <a:extLst>
+              <a:ext uri="{FF2B5EF4-FFF2-40B4-BE49-F238E27FC236}">
+                <a16:creationId xmlns:a16="http://schemas.microsoft.com/office/drawing/2014/main" id="{ABA2827B-5A50-41AC-91DD-82EDA05810BB}"/>
+              </a:ext>
+            </a:extLst>
+          </p:cNvPr>
+          <p:cNvSpPr txBox="1"/>
+          <p:nvPr/>
+        </p:nvSpPr>
+        <p:spPr>
+          <a:xfrm>
+            <a:off x="10760519" y="7524866"/>
+            <a:ext cx="2862962" cy="698267"/>
+          </a:xfrm>
+          <a:prstGeom prst="rect">
+            <a:avLst/>
+          </a:prstGeom>
+          <a:noFill/>
+          <a:ln w="12700" cap="flat">
+            <a:noFill/>
+            <a:miter lim="400000"/>
+          </a:ln>
+          <a:effectLst/>
+          <a:sp3d/>
+        </p:spPr>
+        <p:style>
+          <a:lnRef idx="0">
+            <a:scrgbClr r="0" g="0" b="0"/>
+          </a:lnRef>
+          <a:fillRef idx="0">
+            <a:scrgbClr r="0" g="0" b="0"/>
+          </a:fillRef>
+          <a:effectRef idx="0">
+            <a:scrgbClr r="0" g="0" b="0"/>
+          </a:effectRef>
+          <a:fontRef idx="none"/>
+        </p:style>
+        <p:txBody>
+          <a:bodyPr rot="0" spcFirstLastPara="1" vertOverflow="overflow" horzOverflow="overflow" vert="horz" wrap="none" lIns="71437" tIns="71437" rIns="71437" bIns="71437" numCol="1" spcCol="38100" rtlCol="0" anchor="ctr">
+            <a:spAutoFit/>
+          </a:bodyPr>
+          <a:lstStyle/>
+          <a:p>
+            <a:pPr marL="0" marR="0" indent="0" defTabSz="943239" rtl="0" fontAlgn="auto" latinLnBrk="0" hangingPunct="0">
+              <a:lnSpc>
+                <a:spcPct val="100000"/>
+              </a:lnSpc>
+              <a:spcBef>
+                <a:spcPts val="0"/>
+              </a:spcBef>
+              <a:spcAft>
+                <a:spcPts val="0"/>
+              </a:spcAft>
+              <a:buClrTx/>
+              <a:buSzTx/>
+              <a:buFontTx/>
+              <a:buNone/>
+              <a:tabLst/>
+            </a:pPr>
+            <a:r>
+              <a:rPr kumimoji="0" lang="es-CO" sz="3600" b="0" i="0" u="none" strike="noStrike" cap="none" spc="0" normalizeH="0" baseline="0" dirty="0">
+                <a:ln>
+                  <a:noFill/>
+                </a:ln>
                 <a:solidFill>
                   <a:schemeClr val="bg1">
-                    <a:lumMod val="85000"/>
-                    <a:lumOff val="15000"/>
+                    <a:lumMod val="75000"/>
+                    <a:lumOff val="25000"/>
                   </a:schemeClr>
                 </a:solidFill>
+                <a:effectLst/>
+                <a:uFillTx/>
+                <a:latin typeface="Helvetica Neue"/>
+                <a:ea typeface="Helvetica Neue"/>
+                <a:cs typeface="Helvetica Neue"/>
+                <a:sym typeface="Helvetica Neue"/>
+                <a:hlinkClick r:id="rId4" action="ppaction://hlinkfile">
+                  <a:extLst>
+                    <a:ext uri="{A12FA001-AC4F-418D-AE19-62706E023703}">
+                      <ahyp:hlinkClr xmlns:ahyp="http://schemas.microsoft.com/office/drawing/2018/hyperlinkcolor" val="tx"/>
+                    </a:ext>
+                  </a:extLst>
+                </a:hlinkClick>
               </a:rPr>
-              <a:t>Joins</a:t>
-            </a:r>
-            <a:r>
-              <a:rPr lang="es-ES" sz="9600" b="1" i="1" dirty="0">
+              <a:t>Abrir </a:t>
+            </a:r>
+            <a:r>
+              <a:rPr kumimoji="0" lang="es-CO" sz="3600" b="0" i="1" u="none" strike="noStrike" cap="none" spc="0" normalizeH="0" baseline="0" dirty="0">
+                <a:ln>
+                  <a:noFill/>
+                </a:ln>
                 <a:solidFill>
                   <a:schemeClr val="bg1">
-                    <a:lumMod val="85000"/>
-                    <a:lumOff val="15000"/>
+                    <a:lumMod val="75000"/>
+                    <a:lumOff val="25000"/>
                   </a:schemeClr>
                 </a:solidFill>
+                <a:effectLst/>
+                <a:uFillTx/>
+                <a:latin typeface="Helvetica Neue"/>
+                <a:ea typeface="Helvetica Neue"/>
+                <a:cs typeface="Helvetica Neue"/>
+                <a:sym typeface="Helvetica Neue"/>
+                <a:hlinkClick r:id="rId4" action="ppaction://hlinkfile">
+                  <a:extLst>
+                    <a:ext uri="{A12FA001-AC4F-418D-AE19-62706E023703}">
+                      <ahyp:hlinkClr xmlns:ahyp="http://schemas.microsoft.com/office/drawing/2018/hyperlinkcolor" val="tx"/>
+                    </a:ext>
+                  </a:extLst>
+                </a:hlinkClick>
               </a:rPr>
-              <a:t> </a:t>
-            </a:r>
-            <a:r>
-              <a:rPr lang="es-ES" sz="9600" b="1" i="1" dirty="0" smtClean="0">
-                <a:solidFill>
-                  <a:schemeClr val="bg1">
-                    <a:lumMod val="85000"/>
-                    <a:lumOff val="15000"/>
-                  </a:schemeClr>
-                </a:solidFill>
-              </a:rPr>
-              <a:t>DML</a:t>
-            </a:r>
-            <a:r>
-              <a:rPr lang="es-ES" sz="9600" b="1" i="1" dirty="0">
-                <a:solidFill>
-                  <a:schemeClr val="bg1">
-                    <a:lumMod val="85000"/>
-                    <a:lumOff val="15000"/>
-                  </a:schemeClr>
-                </a:solidFill>
-              </a:rPr>
-              <a:t>.</a:t>
-            </a:r>
-            <a:endParaRPr lang="es-ES" b="1" i="1" dirty="0"/>
+              <a:t>archivo.</a:t>
+            </a:r>
+            <a:endParaRPr kumimoji="0" lang="es-CO" sz="3600" b="0" i="1" u="none" strike="noStrike" cap="none" spc="0" normalizeH="0" baseline="0" dirty="0">
+              <a:ln>
+                <a:noFill/>
+              </a:ln>
+              <a:solidFill>
+                <a:schemeClr val="bg1">
+                  <a:lumMod val="75000"/>
+                  <a:lumOff val="25000"/>
+                </a:schemeClr>
+              </a:solidFill>
+              <a:effectLst/>
+              <a:uFillTx/>
+              <a:latin typeface="Helvetica Neue"/>
+              <a:ea typeface="Helvetica Neue"/>
+              <a:cs typeface="Helvetica Neue"/>
+              <a:sym typeface="Helvetica Neue"/>
+            </a:endParaRPr>
           </a:p>
         </p:txBody>
       </p:sp>
     </p:spTree>
     <p:extLst>
       <p:ext uri="{BB962C8B-B14F-4D97-AF65-F5344CB8AC3E}">
-        <p14:creationId xmlns:p14="http://schemas.microsoft.com/office/powerpoint/2010/main" val="3142486631"/>
+        <p14:creationId xmlns:p14="http://schemas.microsoft.com/office/powerpoint/2010/main" val="1459062462"/>
       </p:ext>
     </p:extLst>
   </p:cSld>
@@ -4954,21 +5278,10 @@
                   </a:schemeClr>
                 </a:solidFill>
               </a:rPr>
-              <a:t>Prototipo no </a:t>
-            </a:r>
-            <a:r>
-              <a:rPr lang="es-CO" sz="6600" b="1" i="1" dirty="0" smtClean="0">
-                <a:solidFill>
-                  <a:schemeClr val="bg1">
-                    <a:lumMod val="85000"/>
-                    <a:lumOff val="15000"/>
-                  </a:schemeClr>
-                </a:solidFill>
-              </a:rPr>
-              <a:t>funcional, CSS, </a:t>
-            </a:r>
-            <a:r>
-              <a:rPr lang="es-CO" sz="6600" b="1" i="1" dirty="0" err="1" smtClean="0">
+              <a:t>Prototipo no funcional, CSS, </a:t>
+            </a:r>
+            <a:r>
+              <a:rPr lang="es-CO" sz="6600" b="1" i="1" dirty="0" err="1">
                 <a:solidFill>
                   <a:schemeClr val="bg1">
                     <a:lumMod val="85000"/>
@@ -4979,17 +5292,6 @@
               <a:t>mockup</a:t>
             </a:r>
             <a:r>
-              <a:rPr lang="es-CO" sz="6600" b="1" i="1" dirty="0" smtClean="0">
-                <a:solidFill>
-                  <a:schemeClr val="bg1">
-                    <a:lumMod val="85000"/>
-                    <a:lumOff val="15000"/>
-                  </a:schemeClr>
-                </a:solidFill>
-              </a:rPr>
-              <a:t> </a:t>
-            </a:r>
-            <a:r>
               <a:rPr lang="es-CO" sz="6600" b="1" i="1" dirty="0">
                 <a:solidFill>
                   <a:schemeClr val="bg1">
@@ -4998,10 +5300,10 @@
                   </a:schemeClr>
                 </a:solidFill>
               </a:rPr>
-              <a:t>o </a:t>
-            </a:r>
-            <a:r>
-              <a:rPr lang="es-CO" sz="6600" b="1" i="1" dirty="0" err="1" smtClean="0">
+              <a:t> o </a:t>
+            </a:r>
+            <a:r>
+              <a:rPr lang="es-CO" sz="6600" b="1" i="1" dirty="0" err="1">
                 <a:solidFill>
                   <a:schemeClr val="bg1">
                     <a:lumMod val="85000"/>
@@ -5012,7 +5314,7 @@
               <a:t>wireframe</a:t>
             </a:r>
             <a:r>
-              <a:rPr lang="es-CO" sz="6600" b="1" i="1" dirty="0" smtClean="0">
+              <a:rPr lang="es-CO" sz="6600" b="1" i="1" dirty="0">
                 <a:solidFill>
                   <a:schemeClr val="bg1">
                     <a:lumMod val="85000"/>
@@ -5023,6 +5325,142 @@
               <a:t>.</a:t>
             </a:r>
             <a:endParaRPr lang="es-ES" sz="6600" b="1" i="1" dirty="0"/>
+          </a:p>
+        </p:txBody>
+      </p:sp>
+      <p:sp>
+        <p:nvSpPr>
+          <p:cNvPr id="4" name="CuadroTexto 3">
+            <a:extLst>
+              <a:ext uri="{FF2B5EF4-FFF2-40B4-BE49-F238E27FC236}">
+                <a16:creationId xmlns:a16="http://schemas.microsoft.com/office/drawing/2014/main" id="{8B33BD89-A985-4D04-837E-95C05D6E0ACF}"/>
+              </a:ext>
+            </a:extLst>
+          </p:cNvPr>
+          <p:cNvSpPr txBox="1"/>
+          <p:nvPr/>
+        </p:nvSpPr>
+        <p:spPr>
+          <a:xfrm>
+            <a:off x="10760519" y="7524866"/>
+            <a:ext cx="2862962" cy="698267"/>
+          </a:xfrm>
+          <a:prstGeom prst="rect">
+            <a:avLst/>
+          </a:prstGeom>
+          <a:noFill/>
+          <a:ln w="12700" cap="flat">
+            <a:noFill/>
+            <a:miter lim="400000"/>
+          </a:ln>
+          <a:effectLst/>
+          <a:sp3d/>
+        </p:spPr>
+        <p:style>
+          <a:lnRef idx="0">
+            <a:scrgbClr r="0" g="0" b="0"/>
+          </a:lnRef>
+          <a:fillRef idx="0">
+            <a:scrgbClr r="0" g="0" b="0"/>
+          </a:fillRef>
+          <a:effectRef idx="0">
+            <a:scrgbClr r="0" g="0" b="0"/>
+          </a:effectRef>
+          <a:fontRef idx="none"/>
+        </p:style>
+        <p:txBody>
+          <a:bodyPr rot="0" spcFirstLastPara="1" vertOverflow="overflow" horzOverflow="overflow" vert="horz" wrap="none" lIns="71437" tIns="71437" rIns="71437" bIns="71437" numCol="1" spcCol="38100" rtlCol="0" anchor="ctr">
+            <a:spAutoFit/>
+          </a:bodyPr>
+          <a:lstStyle/>
+          <a:p>
+            <a:pPr marL="0" marR="0" indent="0" defTabSz="943239" rtl="0" fontAlgn="auto" latinLnBrk="0" hangingPunct="0">
+              <a:lnSpc>
+                <a:spcPct val="100000"/>
+              </a:lnSpc>
+              <a:spcBef>
+                <a:spcPts val="0"/>
+              </a:spcBef>
+              <a:spcAft>
+                <a:spcPts val="0"/>
+              </a:spcAft>
+              <a:buClrTx/>
+              <a:buSzTx/>
+              <a:buFontTx/>
+              <a:buNone/>
+              <a:tabLst/>
+            </a:pPr>
+            <a:r>
+              <a:rPr kumimoji="0" lang="es-CO" sz="3600" b="0" i="0" u="none" strike="noStrike" cap="none" spc="0" normalizeH="0" baseline="0" dirty="0">
+                <a:ln>
+                  <a:noFill/>
+                </a:ln>
+                <a:solidFill>
+                  <a:schemeClr val="bg1">
+                    <a:lumMod val="75000"/>
+                    <a:lumOff val="25000"/>
+                  </a:schemeClr>
+                </a:solidFill>
+                <a:effectLst/>
+                <a:uFillTx/>
+                <a:latin typeface="Helvetica Neue"/>
+                <a:ea typeface="Helvetica Neue"/>
+                <a:cs typeface="Helvetica Neue"/>
+                <a:sym typeface="Helvetica Neue"/>
+                <a:hlinkClick r:id="rId4">
+                  <a:extLst>
+                    <a:ext uri="{A12FA001-AC4F-418D-AE19-62706E023703}">
+                      <ahyp:hlinkClr xmlns:ahyp="http://schemas.microsoft.com/office/drawing/2018/hyperlinkcolor" val="tx"/>
+                    </a:ext>
+                  </a:extLst>
+                </a:hlinkClick>
+              </a:rPr>
+              <a:t>Abrir </a:t>
+            </a:r>
+            <a:r>
+              <a:rPr kumimoji="0" lang="es-CO" sz="3600" b="0" i="1" u="none" strike="noStrike" cap="none" spc="0" normalizeH="0" baseline="0" dirty="0">
+                <a:ln>
+                  <a:noFill/>
+                </a:ln>
+                <a:solidFill>
+                  <a:schemeClr val="bg1">
+                    <a:lumMod val="75000"/>
+                    <a:lumOff val="25000"/>
+                  </a:schemeClr>
+                </a:solidFill>
+                <a:effectLst/>
+                <a:uFillTx/>
+                <a:latin typeface="Helvetica Neue"/>
+                <a:ea typeface="Helvetica Neue"/>
+                <a:cs typeface="Helvetica Neue"/>
+                <a:sym typeface="Helvetica Neue"/>
+                <a:hlinkClick r:id="rId4">
+                  <a:extLst>
+                    <a:ext uri="{A12FA001-AC4F-418D-AE19-62706E023703}">
+                      <ahyp:hlinkClr xmlns:ahyp="http://schemas.microsoft.com/office/drawing/2018/hyperlinkcolor" val="tx"/>
+                    </a:ext>
+                  </a:extLst>
+                </a:hlinkClick>
+              </a:rPr>
+              <a:t>archivo.</a:t>
+            </a:r>
+            <a:endParaRPr kumimoji="0" lang="es-CO" sz="3600" b="0" i="1" u="none" strike="noStrike" cap="none" spc="0" normalizeH="0" baseline="0" dirty="0">
+              <a:ln>
+                <a:noFill/>
+              </a:ln>
+              <a:solidFill>
+                <a:schemeClr val="bg1">
+                  <a:lumMod val="75000"/>
+                  <a:lumOff val="25000"/>
+                </a:schemeClr>
+              </a:solidFill>
+              <a:effectLst/>
+              <a:uFillTx/>
+              <a:latin typeface="Helvetica Neue"/>
+              <a:ea typeface="Helvetica Neue"/>
+              <a:cs typeface="Helvetica Neue"/>
+              <a:sym typeface="Helvetica Neue"/>
+            </a:endParaRPr>
           </a:p>
         </p:txBody>
       </p:sp>

</xml_diff>

<commit_message>
Add :Actualizacion ieee930 diccionario de datos
</commit_message>
<xml_diff>
--- a/3.Diseño/Presentacion2tri.pptx
+++ b/3.Diseño/Presentacion2tri.pptx
@@ -1556,7 +1556,7 @@
           </a:ln>
           <a:extLst>
             <a:ext uri="{C572A759-6A51-4108-AA02-DFA0A04FC94B}">
-              <ma14:wrappingTextBoxFlag xmlns:ma14="http://schemas.microsoft.com/office/mac/drawingml/2011/main" xmlns="" val="1"/>
+              <ma14:wrappingTextBoxFlag xmlns="" xmlns:ma14="http://schemas.microsoft.com/office/mac/drawingml/2011/main" val="1"/>
             </a:ext>
           </a:extLst>
         </p:spPr>
@@ -1619,7 +1619,7 @@
           </a:ln>
           <a:extLst>
             <a:ext uri="{C572A759-6A51-4108-AA02-DFA0A04FC94B}">
-              <ma14:wrappingTextBoxFlag xmlns:ma14="http://schemas.microsoft.com/office/mac/drawingml/2011/main" xmlns="" val="1"/>
+              <ma14:wrappingTextBoxFlag xmlns="" xmlns:ma14="http://schemas.microsoft.com/office/mac/drawingml/2011/main" val="1"/>
             </a:ext>
           </a:extLst>
         </p:spPr>
@@ -2722,7 +2722,7 @@
 </file>
 
 <file path=ppt/slides/slide10.xml><?xml version="1.0" encoding="utf-8"?>
-<p:sld xmlns:a="http://schemas.openxmlformats.org/drawingml/2006/main" xmlns:r="http://schemas.openxmlformats.org/officeDocument/2006/relationships" xmlns:p="http://schemas.openxmlformats.org/presentationml/2006/main">
+<p:sld xmlns:a="http://schemas.openxmlformats.org/drawingml/2006/main" xmlns:r="http://schemas.openxmlformats.org/officeDocument/2006/relationships" xmlns:p="http://schemas.openxmlformats.org/presentationml/2006/main" show="0">
   <p:cSld>
     <p:bg>
       <p:bgPr>
@@ -3263,8 +3263,8 @@
         </p:nvSpPr>
         <p:spPr>
           <a:xfrm>
-            <a:off x="2585545" y="2427888"/>
-            <a:ext cx="21087195" cy="2201109"/>
+            <a:off x="3258732" y="2427888"/>
+            <a:ext cx="17866535" cy="2201109"/>
           </a:xfrm>
         </p:spPr>
         <p:txBody>
@@ -3282,7 +3282,7 @@
                   </a:schemeClr>
                 </a:solidFill>
               </a:rPr>
-              <a:t>Costos (Hardware – Software, GANTT PROJECT)</a:t>
+              <a:t>Inventario - costos (Hardware – Software, GANTT PROJECT)</a:t>
             </a:r>
             <a:endParaRPr lang="es-ES" sz="7200" b="1" i="1" dirty="0"/>
           </a:p>
@@ -3951,7 +3951,7 @@
         </p:spPr>
         <p:txBody>
           <a:bodyPr>
-            <a:normAutofit fontScale="92500"/>
+            <a:normAutofit lnSpcReduction="10000"/>
           </a:bodyPr>
           <a:lstStyle/>
           <a:p>
@@ -3986,23 +3986,6 @@
                 </a:solidFill>
               </a:rPr>
               <a:t>Objetivo general , problema y alcance</a:t>
-            </a:r>
-          </a:p>
-          <a:p>
-            <a:pPr marL="914400" lvl="2" indent="-914400" algn="l">
-              <a:buFont typeface="+mj-lt"/>
-              <a:buAutoNum type="arabicPeriod"/>
-            </a:pPr>
-            <a:r>
-              <a:rPr lang="es-CO" sz="4000" dirty="0">
-                <a:solidFill>
-                  <a:schemeClr val="bg1">
-                    <a:lumMod val="85000"/>
-                    <a:lumOff val="15000"/>
-                  </a:schemeClr>
-                </a:solidFill>
-              </a:rPr>
-              <a:t>Modelo conceptual</a:t>
             </a:r>
           </a:p>
           <a:p>

</xml_diff>

<commit_message>
Refactor: se actualiza inventario , presentacion 2 trimestre , sentencias ffl y presupuesto
</commit_message>
<xml_diff>
--- a/3.Diseño/Presentacion2tri.pptx
+++ b/3.Diseño/Presentacion2tri.pptx
@@ -1556,7 +1556,7 @@
           </a:ln>
           <a:extLst>
             <a:ext uri="{C572A759-6A51-4108-AA02-DFA0A04FC94B}">
-              <ma14:wrappingTextBoxFlag xmlns="" xmlns:ma14="http://schemas.microsoft.com/office/mac/drawingml/2011/main" val="1"/>
+              <ma14:wrappingTextBoxFlag xmlns:ma14="http://schemas.microsoft.com/office/mac/drawingml/2011/main" xmlns="" val="1"/>
             </a:ext>
           </a:extLst>
         </p:spPr>
@@ -1619,7 +1619,7 @@
           </a:ln>
           <a:extLst>
             <a:ext uri="{C572A759-6A51-4108-AA02-DFA0A04FC94B}">
-              <ma14:wrappingTextBoxFlag xmlns="" xmlns:ma14="http://schemas.microsoft.com/office/mac/drawingml/2011/main" val="1"/>
+              <ma14:wrappingTextBoxFlag xmlns:ma14="http://schemas.microsoft.com/office/mac/drawingml/2011/main" xmlns="" val="1"/>
             </a:ext>
           </a:extLst>
         </p:spPr>
@@ -2683,7 +2683,7 @@
                   </a:schemeClr>
                 </a:solidFill>
               </a:rPr>
-              <a:t>Graciela Arias</a:t>
+              <a:t>Graciela Arias – María Pilar Bonilla</a:t>
             </a:r>
           </a:p>
         </p:txBody>
@@ -2722,7 +2722,7 @@
 </file>
 
 <file path=ppt/slides/slide10.xml><?xml version="1.0" encoding="utf-8"?>
-<p:sld xmlns:a="http://schemas.openxmlformats.org/drawingml/2006/main" xmlns:r="http://schemas.openxmlformats.org/officeDocument/2006/relationships" xmlns:p="http://schemas.openxmlformats.org/presentationml/2006/main" show="0">
+<p:sld xmlns:a="http://schemas.openxmlformats.org/drawingml/2006/main" xmlns:r="http://schemas.openxmlformats.org/officeDocument/2006/relationships" xmlns:p="http://schemas.openxmlformats.org/presentationml/2006/main">
   <p:cSld>
     <p:bg>
       <p:bgPr>
@@ -2785,13 +2785,13 @@
         </p:nvSpPr>
         <p:spPr>
           <a:xfrm>
-            <a:off x="3982599" y="1828799"/>
+            <a:off x="2788364" y="2316479"/>
             <a:ext cx="18807272" cy="2201109"/>
           </a:xfrm>
         </p:spPr>
         <p:txBody>
           <a:bodyPr>
-            <a:normAutofit fontScale="90000"/>
+            <a:normAutofit/>
           </a:bodyPr>
           <a:lstStyle/>
           <a:p>
@@ -2804,7 +2804,7 @@
                   </a:schemeClr>
                 </a:solidFill>
               </a:rPr>
-              <a:t>Inventario, sistema de información</a:t>
+              <a:t>Inventario</a:t>
             </a:r>
             <a:endParaRPr lang="es-ES" b="1" i="1" dirty="0"/>
           </a:p>
@@ -3699,7 +3699,7 @@
 </file>
 
 <file path=ppt/slides/slide2.xml><?xml version="1.0" encoding="utf-8"?>
-<p:sld xmlns:a="http://schemas.openxmlformats.org/drawingml/2006/main" xmlns:r="http://schemas.openxmlformats.org/officeDocument/2006/relationships" xmlns:p="http://schemas.openxmlformats.org/presentationml/2006/main">
+<p:sld xmlns:a="http://schemas.openxmlformats.org/drawingml/2006/main" xmlns:r="http://schemas.openxmlformats.org/officeDocument/2006/relationships" xmlns:p="http://schemas.openxmlformats.org/presentationml/2006/main" show="0">
   <p:cSld>
     <p:bg>
       <p:bgPr>
@@ -4216,7 +4216,7 @@
 </file>
 
 <file path=ppt/slides/slide4.xml><?xml version="1.0" encoding="utf-8"?>
-<p:sld xmlns:a="http://schemas.openxmlformats.org/drawingml/2006/main" xmlns:r="http://schemas.openxmlformats.org/officeDocument/2006/relationships" xmlns:p="http://schemas.openxmlformats.org/presentationml/2006/main">
+<p:sld xmlns:a="http://schemas.openxmlformats.org/drawingml/2006/main" xmlns:r="http://schemas.openxmlformats.org/officeDocument/2006/relationships" xmlns:p="http://schemas.openxmlformats.org/presentationml/2006/main" show="0">
   <p:cSld>
     <p:bg>
       <p:bgPr>
@@ -4546,7 +4546,7 @@
 </file>
 
 <file path=ppt/slides/slide6.xml><?xml version="1.0" encoding="utf-8"?>
-<p:sld xmlns:a="http://schemas.openxmlformats.org/drawingml/2006/main" xmlns:r="http://schemas.openxmlformats.org/officeDocument/2006/relationships" xmlns:p="http://schemas.openxmlformats.org/presentationml/2006/main">
+<p:sld xmlns:a="http://schemas.openxmlformats.org/drawingml/2006/main" xmlns:r="http://schemas.openxmlformats.org/officeDocument/2006/relationships" xmlns:p="http://schemas.openxmlformats.org/presentationml/2006/main" show="0">
   <p:cSld>
     <p:bg>
       <p:bgPr>
@@ -4764,18 +4764,18 @@
         </p:nvSpPr>
         <p:spPr>
           <a:xfrm>
-            <a:off x="4581689" y="2144110"/>
+            <a:off x="3525810" y="3207635"/>
             <a:ext cx="17332380" cy="2201109"/>
           </a:xfrm>
         </p:spPr>
         <p:txBody>
           <a:bodyPr>
-            <a:normAutofit/>
+            <a:normAutofit fontScale="90000"/>
           </a:bodyPr>
           <a:lstStyle/>
           <a:p>
             <a:r>
-              <a:rPr lang="es-ES" sz="9600" b="1" i="1" dirty="0">
+              <a:rPr lang="es-CO" sz="9600" b="1" i="1" dirty="0">
                 <a:solidFill>
                   <a:schemeClr val="bg1">
                     <a:lumMod val="85000"/>
@@ -4783,7 +4783,7 @@
                   </a:schemeClr>
                 </a:solidFill>
               </a:rPr>
-              <a:t>Consultas DDL.</a:t>
+              <a:t>Lenguaje de definición de datos (DDL)</a:t>
             </a:r>
             <a:endParaRPr lang="es-ES" b="1" i="1" dirty="0"/>
           </a:p>
@@ -5003,18 +5003,18 @@
         </p:nvSpPr>
         <p:spPr>
           <a:xfrm>
-            <a:off x="4581689" y="2144110"/>
+            <a:off x="3525810" y="2997550"/>
             <a:ext cx="17332380" cy="2201109"/>
           </a:xfrm>
         </p:spPr>
         <p:txBody>
           <a:bodyPr>
-            <a:normAutofit/>
+            <a:normAutofit fontScale="90000"/>
           </a:bodyPr>
           <a:lstStyle/>
           <a:p>
             <a:r>
-              <a:rPr lang="es-ES" sz="9600" b="1" i="1" dirty="0">
+              <a:rPr lang="es-CO" sz="9600" b="1" i="1" dirty="0">
                 <a:solidFill>
                   <a:schemeClr val="bg1">
                     <a:lumMod val="85000"/>
@@ -5022,7 +5022,7 @@
                   </a:schemeClr>
                 </a:solidFill>
               </a:rPr>
-              <a:t>Consultas DML.</a:t>
+              <a:t>Lenguaje de manipulación de datos (DML)</a:t>
             </a:r>
             <a:endParaRPr lang="es-ES" b="1" i="1" dirty="0"/>
           </a:p>

</xml_diff>